<commit_message>
compressed some images, made appendix able to be added easily.
</commit_message>
<xml_diff>
--- a/RA-L/pictures/pdf/PositionNrobots.pptx
+++ b/RA-L/pictures/pdf/PositionNrobots.pptx
@@ -288,7 +288,7 @@
           <a:p>
             <a:fld id="{D9007BAF-787B-5B4F-8632-C84DCD7706EC}" type="datetimeFigureOut">
               <a:rPr lang="en-US" smtClean="0"/>
-              <a:t>8/31/16</a:t>
+              <a:t>9/6/16</a:t>
             </a:fld>
             <a:endParaRPr lang="en-US"/>
           </a:p>
@@ -458,7 +458,7 @@
           <a:p>
             <a:fld id="{D9007BAF-787B-5B4F-8632-C84DCD7706EC}" type="datetimeFigureOut">
               <a:rPr lang="en-US" smtClean="0"/>
-              <a:t>8/31/16</a:t>
+              <a:t>9/6/16</a:t>
             </a:fld>
             <a:endParaRPr lang="en-US"/>
           </a:p>
@@ -638,7 +638,7 @@
           <a:p>
             <a:fld id="{D9007BAF-787B-5B4F-8632-C84DCD7706EC}" type="datetimeFigureOut">
               <a:rPr lang="en-US" smtClean="0"/>
-              <a:t>8/31/16</a:t>
+              <a:t>9/6/16</a:t>
             </a:fld>
             <a:endParaRPr lang="en-US"/>
           </a:p>
@@ -808,7 +808,7 @@
           <a:p>
             <a:fld id="{D9007BAF-787B-5B4F-8632-C84DCD7706EC}" type="datetimeFigureOut">
               <a:rPr lang="en-US" smtClean="0"/>
-              <a:t>8/31/16</a:t>
+              <a:t>9/6/16</a:t>
             </a:fld>
             <a:endParaRPr lang="en-US"/>
           </a:p>
@@ -1054,7 +1054,7 @@
           <a:p>
             <a:fld id="{D9007BAF-787B-5B4F-8632-C84DCD7706EC}" type="datetimeFigureOut">
               <a:rPr lang="en-US" smtClean="0"/>
-              <a:t>8/31/16</a:t>
+              <a:t>9/6/16</a:t>
             </a:fld>
             <a:endParaRPr lang="en-US"/>
           </a:p>
@@ -1342,7 +1342,7 @@
           <a:p>
             <a:fld id="{D9007BAF-787B-5B4F-8632-C84DCD7706EC}" type="datetimeFigureOut">
               <a:rPr lang="en-US" smtClean="0"/>
-              <a:t>8/31/16</a:t>
+              <a:t>9/6/16</a:t>
             </a:fld>
             <a:endParaRPr lang="en-US"/>
           </a:p>
@@ -1764,7 +1764,7 @@
           <a:p>
             <a:fld id="{D9007BAF-787B-5B4F-8632-C84DCD7706EC}" type="datetimeFigureOut">
               <a:rPr lang="en-US" smtClean="0"/>
-              <a:t>8/31/16</a:t>
+              <a:t>9/6/16</a:t>
             </a:fld>
             <a:endParaRPr lang="en-US"/>
           </a:p>
@@ -1882,7 +1882,7 @@
           <a:p>
             <a:fld id="{D9007BAF-787B-5B4F-8632-C84DCD7706EC}" type="datetimeFigureOut">
               <a:rPr lang="en-US" smtClean="0"/>
-              <a:t>8/31/16</a:t>
+              <a:t>9/6/16</a:t>
             </a:fld>
             <a:endParaRPr lang="en-US"/>
           </a:p>
@@ -1977,7 +1977,7 @@
           <a:p>
             <a:fld id="{D9007BAF-787B-5B4F-8632-C84DCD7706EC}" type="datetimeFigureOut">
               <a:rPr lang="en-US" smtClean="0"/>
-              <a:t>8/31/16</a:t>
+              <a:t>9/6/16</a:t>
             </a:fld>
             <a:endParaRPr lang="en-US"/>
           </a:p>
@@ -2254,7 +2254,7 @@
           <a:p>
             <a:fld id="{D9007BAF-787B-5B4F-8632-C84DCD7706EC}" type="datetimeFigureOut">
               <a:rPr lang="en-US" smtClean="0"/>
-              <a:t>8/31/16</a:t>
+              <a:t>9/6/16</a:t>
             </a:fld>
             <a:endParaRPr lang="en-US"/>
           </a:p>
@@ -2507,7 +2507,7 @@
           <a:p>
             <a:fld id="{D9007BAF-787B-5B4F-8632-C84DCD7706EC}" type="datetimeFigureOut">
               <a:rPr lang="en-US" smtClean="0"/>
-              <a:t>8/31/16</a:t>
+              <a:t>9/6/16</a:t>
             </a:fld>
             <a:endParaRPr lang="en-US"/>
           </a:p>
@@ -2720,7 +2720,7 @@
           <a:p>
             <a:fld id="{D9007BAF-787B-5B4F-8632-C84DCD7706EC}" type="datetimeFigureOut">
               <a:rPr lang="en-US" smtClean="0"/>
-              <a:t>8/31/16</a:t>
+              <a:t>9/6/16</a:t>
             </a:fld>
             <a:endParaRPr lang="en-US"/>
           </a:p>

</xml_diff>